<commit_message>
Update Lab2_probing.pptx with new content and enhancements
</commit_message>
<xml_diff>
--- a/slides/Lab2_probing.pptx
+++ b/slides/Lab2_probing.pptx
@@ -5,7 +5,7 @@
     <p:sldMasterId id="2147483648" r:id="rId1"/>
   </p:sldMasterIdLst>
   <p:notesMasterIdLst>
-    <p:notesMasterId r:id="rId18"/>
+    <p:notesMasterId r:id="rId21"/>
   </p:notesMasterIdLst>
   <p:sldIdLst>
     <p:sldId id="257" r:id="rId2"/>
@@ -23,7 +23,10 @@
     <p:sldId id="265" r:id="rId14"/>
     <p:sldId id="267" r:id="rId15"/>
     <p:sldId id="269" r:id="rId16"/>
-    <p:sldId id="275" r:id="rId17"/>
+    <p:sldId id="279" r:id="rId17"/>
+    <p:sldId id="276" r:id="rId18"/>
+    <p:sldId id="277" r:id="rId19"/>
+    <p:sldId id="275" r:id="rId20"/>
   </p:sldIdLst>
   <p:sldSz cx="12192000" cy="6858000"/>
   <p:notesSz cx="6858000" cy="9144000"/>
@@ -33314,6 +33317,864 @@
         <p:cNvPr id="1" name="">
           <a:extLst>
             <a:ext uri="{FF2B5EF4-FFF2-40B4-BE49-F238E27FC236}">
+              <a16:creationId xmlns:a16="http://schemas.microsoft.com/office/drawing/2014/main" id="{94812F0C-3833-4AC2-E321-3C3AC716EED0}"/>
+            </a:ext>
+          </a:extLst>
+        </p:cNvPr>
+        <p:cNvGrpSpPr/>
+        <p:nvPr/>
+      </p:nvGrpSpPr>
+      <p:grpSpPr>
+        <a:xfrm>
+          <a:off x="0" y="0"/>
+          <a:ext cx="0" cy="0"/>
+          <a:chOff x="0" y="0"/>
+          <a:chExt cx="0" cy="0"/>
+        </a:xfrm>
+      </p:grpSpPr>
+      <p:sp>
+        <p:nvSpPr>
+          <p:cNvPr id="2" name="Title 1">
+            <a:extLst>
+              <a:ext uri="{FF2B5EF4-FFF2-40B4-BE49-F238E27FC236}">
+                <a16:creationId xmlns:a16="http://schemas.microsoft.com/office/drawing/2014/main" id="{ACD8FEE4-127C-61C6-736A-4804BB7E99F6}"/>
+              </a:ext>
+            </a:extLst>
+          </p:cNvPr>
+          <p:cNvSpPr>
+            <a:spLocks noGrp="1"/>
+          </p:cNvSpPr>
+          <p:nvPr>
+            <p:ph type="title"/>
+          </p:nvPr>
+        </p:nvSpPr>
+        <p:spPr>
+          <a:prstGeom prst="roundRect">
+            <a:avLst/>
+          </a:prstGeom>
+          <a:solidFill>
+            <a:schemeClr val="accent1"/>
+          </a:solidFill>
+        </p:spPr>
+        <p:txBody>
+          <a:bodyPr/>
+          <a:lstStyle/>
+          <a:p>
+            <a:pPr algn="ctr"/>
+            <a:r>
+              <a:rPr lang="en-GB" dirty="0">
+                <a:solidFill>
+                  <a:schemeClr val="bg1"/>
+                </a:solidFill>
+              </a:rPr>
+              <a:t>Degree of freedom</a:t>
+            </a:r>
+          </a:p>
+        </p:txBody>
+      </p:sp>
+      <p:sp>
+        <p:nvSpPr>
+          <p:cNvPr id="3" name="Slide Number Placeholder 2">
+            <a:extLst>
+              <a:ext uri="{FF2B5EF4-FFF2-40B4-BE49-F238E27FC236}">
+                <a16:creationId xmlns:a16="http://schemas.microsoft.com/office/drawing/2014/main" id="{E70FB338-44CF-EEED-811A-D22C74FD2558}"/>
+              </a:ext>
+            </a:extLst>
+          </p:cNvPr>
+          <p:cNvSpPr>
+            <a:spLocks noGrp="1"/>
+          </p:cNvSpPr>
+          <p:nvPr>
+            <p:ph type="sldNum" sz="quarter" idx="12"/>
+          </p:nvPr>
+        </p:nvSpPr>
+        <p:spPr/>
+        <p:txBody>
+          <a:bodyPr/>
+          <a:lstStyle/>
+          <a:p>
+            <a:fld id="{33C14F82-BE8C-4CA8-BA76-52B2F053D2D8}" type="slidenum">
+              <a:rPr lang="en-GB" smtClean="0"/>
+              <a:t>16</a:t>
+            </a:fld>
+            <a:endParaRPr lang="en-GB"/>
+          </a:p>
+        </p:txBody>
+      </p:sp>
+      <p:sp>
+        <p:nvSpPr>
+          <p:cNvPr id="4" name="TextBox 3">
+            <a:extLst>
+              <a:ext uri="{FF2B5EF4-FFF2-40B4-BE49-F238E27FC236}">
+                <a16:creationId xmlns:a16="http://schemas.microsoft.com/office/drawing/2014/main" id="{5850E877-5F3E-52BF-FEED-E6A9F9DD312B}"/>
+              </a:ext>
+            </a:extLst>
+          </p:cNvPr>
+          <p:cNvSpPr txBox="1"/>
+          <p:nvPr/>
+        </p:nvSpPr>
+        <p:spPr>
+          <a:xfrm>
+            <a:off x="1019869" y="2061853"/>
+            <a:ext cx="10208628" cy="3785652"/>
+          </a:xfrm>
+          <a:prstGeom prst="rect">
+            <a:avLst/>
+          </a:prstGeom>
+          <a:noFill/>
+        </p:spPr>
+        <p:txBody>
+          <a:bodyPr wrap="none" rtlCol="0">
+            <a:spAutoFit/>
+          </a:bodyPr>
+          <a:lstStyle/>
+          <a:p>
+            <a:pPr marL="342900" indent="-342900">
+              <a:buAutoNum type="arabicPeriod"/>
+            </a:pPr>
+            <a:r>
+              <a:rPr lang="en-GB" sz="2400" dirty="0">
+                <a:highlight>
+                  <a:srgbClr val="FFFF00"/>
+                </a:highlight>
+              </a:rPr>
+              <a:t>Latent features being targeted</a:t>
+            </a:r>
+          </a:p>
+          <a:p>
+            <a:pPr marL="800100" lvl="1" indent="-342900">
+              <a:buFont typeface="Arial" panose="020B0604020202020204" pitchFamily="34" charset="0"/>
+              <a:buChar char="•"/>
+            </a:pPr>
+            <a:r>
+              <a:rPr lang="en-GB" sz="2400" dirty="0">
+                <a:sym typeface="Wingdings" panose="05000000000000000000" pitchFamily="2" charset="2"/>
+              </a:rPr>
+              <a:t>We cannot find what is not encoded</a:t>
+            </a:r>
+            <a:endParaRPr lang="en-GB" sz="2400" dirty="0"/>
+          </a:p>
+          <a:p>
+            <a:pPr marL="342900" indent="-342900">
+              <a:buAutoNum type="arabicPeriod"/>
+            </a:pPr>
+            <a:r>
+              <a:rPr lang="en-GB" sz="2400" dirty="0">
+                <a:highlight>
+                  <a:srgbClr val="FFFF00"/>
+                </a:highlight>
+              </a:rPr>
+              <a:t>Choice of the hidden layer </a:t>
+            </a:r>
+            <a:endParaRPr lang="en-GB" sz="2400" dirty="0">
+              <a:highlight>
+                <a:srgbClr val="FFFF00"/>
+              </a:highlight>
+              <a:sym typeface="Wingdings" panose="05000000000000000000" pitchFamily="2" charset="2"/>
+            </a:endParaRPr>
+          </a:p>
+          <a:p>
+            <a:pPr marL="800100" lvl="1" indent="-342900">
+              <a:buFont typeface="Arial" panose="020B0604020202020204" pitchFamily="34" charset="0"/>
+              <a:buChar char="•"/>
+            </a:pPr>
+            <a:r>
+              <a:rPr lang="en-GB" sz="2400" dirty="0">
+                <a:sym typeface="Wingdings" panose="05000000000000000000" pitchFamily="2" charset="2"/>
+              </a:rPr>
+              <a:t>There’s not right answer, but the median layer is generally the best one</a:t>
+            </a:r>
+            <a:endParaRPr lang="en-GB" sz="2400" dirty="0"/>
+          </a:p>
+          <a:p>
+            <a:pPr marL="342900" indent="-342900">
+              <a:buAutoNum type="arabicPeriod"/>
+            </a:pPr>
+            <a:r>
+              <a:rPr lang="en-GB" sz="2400" dirty="0">
+                <a:highlight>
+                  <a:srgbClr val="FFFF00"/>
+                </a:highlight>
+              </a:rPr>
+              <a:t>Variability of language models </a:t>
+            </a:r>
+            <a:endParaRPr lang="en-GB" sz="2400" dirty="0">
+              <a:highlight>
+                <a:srgbClr val="FFFF00"/>
+              </a:highlight>
+              <a:sym typeface="Wingdings" panose="05000000000000000000" pitchFamily="2" charset="2"/>
+            </a:endParaRPr>
+          </a:p>
+          <a:p>
+            <a:pPr marL="800100" lvl="1" indent="-342900">
+              <a:buFont typeface="Arial" panose="020B0604020202020204" pitchFamily="34" charset="0"/>
+              <a:buChar char="•"/>
+            </a:pPr>
+            <a:r>
+              <a:rPr lang="en-GB" sz="2400" dirty="0">
+                <a:sym typeface="Wingdings" panose="05000000000000000000" pitchFamily="2" charset="2"/>
+              </a:rPr>
+              <a:t>The dimension matters, especially the embedding dimension</a:t>
+            </a:r>
+            <a:endParaRPr lang="en-GB" sz="2400" dirty="0"/>
+          </a:p>
+          <a:p>
+            <a:pPr marL="342900" indent="-342900">
+              <a:buFontTx/>
+              <a:buAutoNum type="arabicPeriod"/>
+            </a:pPr>
+            <a:r>
+              <a:rPr lang="en-GB" sz="2400" dirty="0">
+                <a:highlight>
+                  <a:srgbClr val="FFFF00"/>
+                </a:highlight>
+              </a:rPr>
+              <a:t>Number of data </a:t>
+            </a:r>
+            <a:endParaRPr lang="en-GB" sz="2400" dirty="0">
+              <a:highlight>
+                <a:srgbClr val="FFFF00"/>
+              </a:highlight>
+              <a:sym typeface="Wingdings" panose="05000000000000000000" pitchFamily="2" charset="2"/>
+            </a:endParaRPr>
+          </a:p>
+          <a:p>
+            <a:pPr marL="800100" lvl="1" indent="-342900">
+              <a:buFont typeface="Arial" panose="020B0604020202020204" pitchFamily="34" charset="0"/>
+              <a:buChar char="•"/>
+            </a:pPr>
+            <a:r>
+              <a:rPr lang="en-GB" sz="2400" dirty="0">
+                <a:sym typeface="Wingdings" panose="05000000000000000000" pitchFamily="2" charset="2"/>
+              </a:rPr>
+              <a:t>More data should lead to increase the </a:t>
+            </a:r>
+            <a:r>
+              <a:rPr lang="en-GB" sz="2400" dirty="0" err="1">
+                <a:sym typeface="Wingdings" panose="05000000000000000000" pitchFamily="2" charset="2"/>
+              </a:rPr>
+              <a:t>generaralization</a:t>
+            </a:r>
+            <a:endParaRPr lang="en-GB" sz="2400" dirty="0"/>
+          </a:p>
+          <a:p>
+            <a:pPr marL="342900" indent="-342900">
+              <a:buAutoNum type="arabicPeriod"/>
+            </a:pPr>
+            <a:r>
+              <a:rPr lang="en-GB" sz="2400" dirty="0">
+                <a:highlight>
+                  <a:srgbClr val="FFFF00"/>
+                </a:highlight>
+              </a:rPr>
+              <a:t>Architecture of the probing model</a:t>
+            </a:r>
+            <a:r>
+              <a:rPr lang="en-GB" sz="2400" dirty="0"/>
+              <a:t> </a:t>
+            </a:r>
+            <a:endParaRPr lang="en-GB" sz="2400" dirty="0">
+              <a:sym typeface="Wingdings" panose="05000000000000000000" pitchFamily="2" charset="2"/>
+            </a:endParaRPr>
+          </a:p>
+          <a:p>
+            <a:pPr marL="800100" lvl="1" indent="-342900">
+              <a:buFont typeface="Arial" panose="020B0604020202020204" pitchFamily="34" charset="0"/>
+              <a:buChar char="•"/>
+            </a:pPr>
+            <a:r>
+              <a:rPr lang="en-GB" sz="2400" dirty="0">
+                <a:sym typeface="Wingdings" panose="05000000000000000000" pitchFamily="2" charset="2"/>
+              </a:rPr>
+              <a:t>It has a huge impact on findings</a:t>
+            </a:r>
+            <a:endParaRPr lang="en-GB" sz="2400" dirty="0"/>
+          </a:p>
+        </p:txBody>
+      </p:sp>
+    </p:spTree>
+    <p:extLst>
+      <p:ext uri="{BB962C8B-B14F-4D97-AF65-F5344CB8AC3E}">
+        <p14:creationId xmlns:p14="http://schemas.microsoft.com/office/powerpoint/2010/main" val="1562383982"/>
+      </p:ext>
+    </p:extLst>
+  </p:cSld>
+  <p:clrMapOvr>
+    <a:masterClrMapping/>
+  </p:clrMapOvr>
+</p:sld>
+</file>
+
+<file path=ppt/slides/slide17.xml><?xml version="1.0" encoding="utf-8"?>
+<p:sld xmlns:a="http://schemas.openxmlformats.org/drawingml/2006/main" xmlns:r="http://schemas.openxmlformats.org/officeDocument/2006/relationships" xmlns:p="http://schemas.openxmlformats.org/presentationml/2006/main">
+  <p:cSld>
+    <p:spTree>
+      <p:nvGrpSpPr>
+        <p:cNvPr id="1" name=""/>
+        <p:cNvGrpSpPr/>
+        <p:nvPr/>
+      </p:nvGrpSpPr>
+      <p:grpSpPr>
+        <a:xfrm>
+          <a:off x="0" y="0"/>
+          <a:ext cx="0" cy="0"/>
+          <a:chOff x="0" y="0"/>
+          <a:chExt cx="0" cy="0"/>
+        </a:xfrm>
+      </p:grpSpPr>
+      <p:sp>
+        <p:nvSpPr>
+          <p:cNvPr id="2" name="Title 1">
+            <a:extLst>
+              <a:ext uri="{FF2B5EF4-FFF2-40B4-BE49-F238E27FC236}">
+                <a16:creationId xmlns:a16="http://schemas.microsoft.com/office/drawing/2014/main" id="{82D7852F-6A14-2349-4F6D-106833DECF5E}"/>
+              </a:ext>
+            </a:extLst>
+          </p:cNvPr>
+          <p:cNvSpPr>
+            <a:spLocks noGrp="1"/>
+          </p:cNvSpPr>
+          <p:nvPr>
+            <p:ph type="title"/>
+          </p:nvPr>
+        </p:nvSpPr>
+        <p:spPr/>
+        <p:txBody>
+          <a:bodyPr/>
+          <a:lstStyle/>
+          <a:p>
+            <a:r>
+              <a:rPr lang="en-GB" dirty="0"/>
+              <a:t>Truthfulness (GPT-2 </a:t>
+            </a:r>
+            <a:r>
+              <a:rPr lang="en-GB" dirty="0">
+                <a:sym typeface="Wingdings" panose="05000000000000000000" pitchFamily="2" charset="2"/>
+              </a:rPr>
+              <a:t> 130M, </a:t>
+            </a:r>
+            <a:r>
+              <a:rPr lang="en-GB" dirty="0"/>
+              <a:t>768 dim)</a:t>
+            </a:r>
+          </a:p>
+        </p:txBody>
+      </p:sp>
+      <p:sp>
+        <p:nvSpPr>
+          <p:cNvPr id="9" name="TextBox 8">
+            <a:extLst>
+              <a:ext uri="{FF2B5EF4-FFF2-40B4-BE49-F238E27FC236}">
+                <a16:creationId xmlns:a16="http://schemas.microsoft.com/office/drawing/2014/main" id="{C3AE2D3F-75B7-8024-B12C-F3C54C8FCC47}"/>
+              </a:ext>
+            </a:extLst>
+          </p:cNvPr>
+          <p:cNvSpPr txBox="1"/>
+          <p:nvPr/>
+        </p:nvSpPr>
+        <p:spPr>
+          <a:xfrm>
+            <a:off x="5970147" y="3429000"/>
+            <a:ext cx="6096000" cy="1477328"/>
+          </a:xfrm>
+          <a:prstGeom prst="rect">
+            <a:avLst/>
+          </a:prstGeom>
+          <a:noFill/>
+        </p:spPr>
+        <p:txBody>
+          <a:bodyPr wrap="square">
+            <a:spAutoFit/>
+          </a:bodyPr>
+          <a:lstStyle/>
+          <a:p>
+            <a:pPr marL="342900" indent="-342900">
+              <a:buFont typeface="+mj-lt"/>
+              <a:buAutoNum type="arabicParenR"/>
+            </a:pPr>
+            <a:r>
+              <a:rPr lang="en-GB" sz="1600" b="0" i="0" dirty="0">
+                <a:solidFill>
+                  <a:schemeClr val="accent3"/>
+                </a:solidFill>
+                <a:effectLst/>
+                <a:latin typeface="Consolas" panose="020B0609020204030204" pitchFamily="49" charset="0"/>
+              </a:rPr>
+              <a:t>The earth is flat --&gt; </a:t>
+            </a:r>
+            <a:r>
+              <a:rPr lang="en-GB" dirty="0">
+                <a:solidFill>
+                  <a:schemeClr val="accent3"/>
+                </a:solidFill>
+              </a:rPr>
+              <a:t>False (0.54)</a:t>
+            </a:r>
+          </a:p>
+          <a:p>
+            <a:pPr marL="342900" indent="-342900">
+              <a:buFont typeface="+mj-lt"/>
+              <a:buAutoNum type="arabicParenR"/>
+            </a:pPr>
+            <a:r>
+              <a:rPr lang="en-GB" sz="1600" b="0" i="0" dirty="0">
+                <a:solidFill>
+                  <a:srgbClr val="C00000"/>
+                </a:solidFill>
+                <a:effectLst/>
+                <a:latin typeface="Consolas" panose="020B0609020204030204" pitchFamily="49" charset="0"/>
+              </a:rPr>
+              <a:t>Water boils at 100 degrees Celsius --&gt; </a:t>
+            </a:r>
+            <a:r>
+              <a:rPr lang="en-GB" dirty="0">
+                <a:solidFill>
+                  <a:srgbClr val="C00000"/>
+                </a:solidFill>
+              </a:rPr>
+              <a:t>False (0.94)</a:t>
+            </a:r>
+            <a:endParaRPr lang="en-GB" sz="1600" b="0" i="0" dirty="0">
+              <a:solidFill>
+                <a:srgbClr val="C00000"/>
+              </a:solidFill>
+              <a:effectLst/>
+              <a:latin typeface="Consolas" panose="020B0609020204030204" pitchFamily="49" charset="0"/>
+            </a:endParaRPr>
+          </a:p>
+          <a:p>
+            <a:pPr marL="342900" indent="-342900">
+              <a:buFont typeface="+mj-lt"/>
+              <a:buAutoNum type="arabicParenR"/>
+            </a:pPr>
+            <a:r>
+              <a:rPr lang="en-GB" sz="1600" b="0" i="0" dirty="0">
+                <a:solidFill>
+                  <a:schemeClr val="accent3"/>
+                </a:solidFill>
+                <a:effectLst/>
+                <a:latin typeface="Consolas" panose="020B0609020204030204" pitchFamily="49" charset="0"/>
+              </a:rPr>
+              <a:t>The sky is green --&gt; </a:t>
+            </a:r>
+            <a:r>
+              <a:rPr lang="en-GB" dirty="0">
+                <a:solidFill>
+                  <a:schemeClr val="accent3"/>
+                </a:solidFill>
+              </a:rPr>
+              <a:t>False (0.92)</a:t>
+            </a:r>
+          </a:p>
+          <a:p>
+            <a:pPr marL="342900" indent="-342900">
+              <a:buFont typeface="+mj-lt"/>
+              <a:buAutoNum type="arabicParenR"/>
+            </a:pPr>
+            <a:r>
+              <a:rPr lang="en-GB" sz="1600" b="0" i="0" dirty="0">
+                <a:solidFill>
+                  <a:srgbClr val="C00000"/>
+                </a:solidFill>
+                <a:effectLst/>
+                <a:latin typeface="Consolas" panose="020B0609020204030204" pitchFamily="49" charset="0"/>
+              </a:rPr>
+              <a:t>The sky is blue --&gt; </a:t>
+            </a:r>
+            <a:r>
+              <a:rPr lang="en-GB" dirty="0">
+                <a:solidFill>
+                  <a:srgbClr val="C00000"/>
+                </a:solidFill>
+              </a:rPr>
+              <a:t>False (0.78)</a:t>
+            </a:r>
+          </a:p>
+          <a:p>
+            <a:pPr marL="342900" indent="-342900">
+              <a:buFont typeface="+mj-lt"/>
+              <a:buAutoNum type="arabicParenR"/>
+            </a:pPr>
+            <a:r>
+              <a:rPr lang="en-GB" sz="1600" b="0" i="0" dirty="0">
+                <a:solidFill>
+                  <a:schemeClr val="accent3"/>
+                </a:solidFill>
+                <a:effectLst/>
+                <a:latin typeface="Consolas" panose="020B0609020204030204" pitchFamily="49" charset="0"/>
+              </a:rPr>
+              <a:t>Renault 8 is produced by Fiat --&gt; </a:t>
+            </a:r>
+            <a:r>
+              <a:rPr lang="en-GB" dirty="0">
+                <a:solidFill>
+                  <a:schemeClr val="accent3"/>
+                </a:solidFill>
+              </a:rPr>
+              <a:t>False (0.87)</a:t>
+            </a:r>
+          </a:p>
+        </p:txBody>
+      </p:sp>
+      <p:sp>
+        <p:nvSpPr>
+          <p:cNvPr id="10" name="TextBox 9">
+            <a:extLst>
+              <a:ext uri="{FF2B5EF4-FFF2-40B4-BE49-F238E27FC236}">
+                <a16:creationId xmlns:a16="http://schemas.microsoft.com/office/drawing/2014/main" id="{E8D30C55-34E5-0D16-008A-D8C7AE15B88E}"/>
+              </a:ext>
+            </a:extLst>
+          </p:cNvPr>
+          <p:cNvSpPr txBox="1"/>
+          <p:nvPr/>
+        </p:nvSpPr>
+        <p:spPr>
+          <a:xfrm>
+            <a:off x="6096000" y="2183140"/>
+            <a:ext cx="3069623" cy="461665"/>
+          </a:xfrm>
+          <a:prstGeom prst="rect">
+            <a:avLst/>
+          </a:prstGeom>
+          <a:noFill/>
+        </p:spPr>
+        <p:txBody>
+          <a:bodyPr wrap="none" rtlCol="0">
+            <a:spAutoFit/>
+          </a:bodyPr>
+          <a:lstStyle/>
+          <a:p>
+            <a:r>
+              <a:rPr lang="en-GB" sz="2400" dirty="0"/>
+              <a:t>[TEST] F1 score = 0.65</a:t>
+            </a:r>
+          </a:p>
+        </p:txBody>
+      </p:sp>
+      <p:pic>
+        <p:nvPicPr>
+          <p:cNvPr id="14" name="Picture 13">
+            <a:extLst>
+              <a:ext uri="{FF2B5EF4-FFF2-40B4-BE49-F238E27FC236}">
+                <a16:creationId xmlns:a16="http://schemas.microsoft.com/office/drawing/2014/main" id="{DA6B3820-EC61-D636-5679-488AC4D52C7E}"/>
+              </a:ext>
+            </a:extLst>
+          </p:cNvPr>
+          <p:cNvPicPr>
+            <a:picLocks noChangeAspect="1"/>
+          </p:cNvPicPr>
+          <p:nvPr/>
+        </p:nvPicPr>
+        <p:blipFill>
+          <a:blip r:embed="rId2"/>
+          <a:stretch>
+            <a:fillRect/>
+          </a:stretch>
+        </p:blipFill>
+        <p:spPr>
+          <a:xfrm>
+            <a:off x="406349" y="1947248"/>
+            <a:ext cx="5381625" cy="4143375"/>
+          </a:xfrm>
+          <a:prstGeom prst="rect">
+            <a:avLst/>
+          </a:prstGeom>
+        </p:spPr>
+      </p:pic>
+    </p:spTree>
+    <p:extLst>
+      <p:ext uri="{BB962C8B-B14F-4D97-AF65-F5344CB8AC3E}">
+        <p14:creationId xmlns:p14="http://schemas.microsoft.com/office/powerpoint/2010/main" val="930962874"/>
+      </p:ext>
+    </p:extLst>
+  </p:cSld>
+  <p:clrMapOvr>
+    <a:masterClrMapping/>
+  </p:clrMapOvr>
+</p:sld>
+</file>
+
+<file path=ppt/slides/slide18.xml><?xml version="1.0" encoding="utf-8"?>
+<p:sld xmlns:a="http://schemas.openxmlformats.org/drawingml/2006/main" xmlns:r="http://schemas.openxmlformats.org/officeDocument/2006/relationships" xmlns:p="http://schemas.openxmlformats.org/presentationml/2006/main">
+  <p:cSld>
+    <p:spTree>
+      <p:nvGrpSpPr>
+        <p:cNvPr id="1" name="">
+          <a:extLst>
+            <a:ext uri="{FF2B5EF4-FFF2-40B4-BE49-F238E27FC236}">
+              <a16:creationId xmlns:a16="http://schemas.microsoft.com/office/drawing/2014/main" id="{C9D23D9A-35A8-B077-9ECF-6EA7912A5543}"/>
+            </a:ext>
+          </a:extLst>
+        </p:cNvPr>
+        <p:cNvGrpSpPr/>
+        <p:nvPr/>
+      </p:nvGrpSpPr>
+      <p:grpSpPr>
+        <a:xfrm>
+          <a:off x="0" y="0"/>
+          <a:ext cx="0" cy="0"/>
+          <a:chOff x="0" y="0"/>
+          <a:chExt cx="0" cy="0"/>
+        </a:xfrm>
+      </p:grpSpPr>
+      <p:sp>
+        <p:nvSpPr>
+          <p:cNvPr id="2" name="Title 1">
+            <a:extLst>
+              <a:ext uri="{FF2B5EF4-FFF2-40B4-BE49-F238E27FC236}">
+                <a16:creationId xmlns:a16="http://schemas.microsoft.com/office/drawing/2014/main" id="{A8B28384-A0BF-184F-B3A6-F0DC18AF0953}"/>
+              </a:ext>
+            </a:extLst>
+          </p:cNvPr>
+          <p:cNvSpPr>
+            <a:spLocks noGrp="1"/>
+          </p:cNvSpPr>
+          <p:nvPr>
+            <p:ph type="title"/>
+          </p:nvPr>
+        </p:nvSpPr>
+        <p:spPr/>
+        <p:txBody>
+          <a:bodyPr/>
+          <a:lstStyle/>
+          <a:p>
+            <a:r>
+              <a:rPr lang="en-GB" dirty="0"/>
+              <a:t>Truthfulness (GPT-2, XL </a:t>
+            </a:r>
+            <a:r>
+              <a:rPr lang="en-GB" dirty="0">
+                <a:sym typeface="Wingdings" panose="05000000000000000000" pitchFamily="2" charset="2"/>
+              </a:rPr>
+              <a:t> 1.5B, </a:t>
+            </a:r>
+            <a:r>
+              <a:rPr lang="en-GB" dirty="0"/>
+              <a:t>1600 dim)</a:t>
+            </a:r>
+          </a:p>
+        </p:txBody>
+      </p:sp>
+      <p:sp>
+        <p:nvSpPr>
+          <p:cNvPr id="5" name="TextBox 4">
+            <a:extLst>
+              <a:ext uri="{FF2B5EF4-FFF2-40B4-BE49-F238E27FC236}">
+                <a16:creationId xmlns:a16="http://schemas.microsoft.com/office/drawing/2014/main" id="{89C29CF8-F170-8DAA-032F-02C9C4175A7E}"/>
+              </a:ext>
+            </a:extLst>
+          </p:cNvPr>
+          <p:cNvSpPr txBox="1"/>
+          <p:nvPr/>
+        </p:nvSpPr>
+        <p:spPr>
+          <a:xfrm>
+            <a:off x="6096000" y="2183140"/>
+            <a:ext cx="3069623" cy="461665"/>
+          </a:xfrm>
+          <a:prstGeom prst="rect">
+            <a:avLst/>
+          </a:prstGeom>
+          <a:noFill/>
+        </p:spPr>
+        <p:txBody>
+          <a:bodyPr wrap="none" rtlCol="0">
+            <a:spAutoFit/>
+          </a:bodyPr>
+          <a:lstStyle/>
+          <a:p>
+            <a:r>
+              <a:rPr lang="en-GB" sz="2400" dirty="0"/>
+              <a:t>[TEST] F1 score = 0.71</a:t>
+            </a:r>
+          </a:p>
+        </p:txBody>
+      </p:sp>
+      <p:pic>
+        <p:nvPicPr>
+          <p:cNvPr id="7" name="Picture 6">
+            <a:extLst>
+              <a:ext uri="{FF2B5EF4-FFF2-40B4-BE49-F238E27FC236}">
+                <a16:creationId xmlns:a16="http://schemas.microsoft.com/office/drawing/2014/main" id="{7B4759FF-61B0-B7DB-B95D-41FB1D1C9693}"/>
+              </a:ext>
+            </a:extLst>
+          </p:cNvPr>
+          <p:cNvPicPr>
+            <a:picLocks noChangeAspect="1"/>
+          </p:cNvPicPr>
+          <p:nvPr/>
+        </p:nvPicPr>
+        <p:blipFill>
+          <a:blip r:embed="rId2"/>
+          <a:stretch>
+            <a:fillRect/>
+          </a:stretch>
+        </p:blipFill>
+        <p:spPr>
+          <a:xfrm>
+            <a:off x="537702" y="2141508"/>
+            <a:ext cx="5295900" cy="4143375"/>
+          </a:xfrm>
+          <a:prstGeom prst="rect">
+            <a:avLst/>
+          </a:prstGeom>
+        </p:spPr>
+      </p:pic>
+      <p:sp>
+        <p:nvSpPr>
+          <p:cNvPr id="9" name="TextBox 8">
+            <a:extLst>
+              <a:ext uri="{FF2B5EF4-FFF2-40B4-BE49-F238E27FC236}">
+                <a16:creationId xmlns:a16="http://schemas.microsoft.com/office/drawing/2014/main" id="{75D94905-7E4C-BA6E-4770-BCF3E0D3736B}"/>
+              </a:ext>
+            </a:extLst>
+          </p:cNvPr>
+          <p:cNvSpPr txBox="1"/>
+          <p:nvPr/>
+        </p:nvSpPr>
+        <p:spPr>
+          <a:xfrm>
+            <a:off x="5970147" y="3429000"/>
+            <a:ext cx="6096000" cy="1354217"/>
+          </a:xfrm>
+          <a:prstGeom prst="rect">
+            <a:avLst/>
+          </a:prstGeom>
+          <a:noFill/>
+        </p:spPr>
+        <p:txBody>
+          <a:bodyPr wrap="square">
+            <a:spAutoFit/>
+          </a:bodyPr>
+          <a:lstStyle/>
+          <a:p>
+            <a:pPr marL="342900" indent="-342900">
+              <a:buFont typeface="+mj-lt"/>
+              <a:buAutoNum type="arabicParenR"/>
+            </a:pPr>
+            <a:r>
+              <a:rPr lang="en-GB" sz="1600" b="0" i="0" dirty="0">
+                <a:solidFill>
+                  <a:schemeClr val="accent3"/>
+                </a:solidFill>
+                <a:effectLst/>
+                <a:latin typeface="Consolas" panose="020B0609020204030204" pitchFamily="49" charset="0"/>
+              </a:rPr>
+              <a:t>The earth is flat --&gt; False (0.88) </a:t>
+            </a:r>
+          </a:p>
+          <a:p>
+            <a:pPr marL="342900" indent="-342900">
+              <a:buFont typeface="+mj-lt"/>
+              <a:buAutoNum type="arabicParenR"/>
+            </a:pPr>
+            <a:r>
+              <a:rPr lang="en-GB" sz="1600" b="0" i="0" dirty="0">
+                <a:solidFill>
+                  <a:schemeClr val="accent3"/>
+                </a:solidFill>
+                <a:effectLst/>
+                <a:latin typeface="Consolas" panose="020B0609020204030204" pitchFamily="49" charset="0"/>
+              </a:rPr>
+              <a:t>Water boils at 100 degrees Celsius --&gt; True (0.58</a:t>
+            </a:r>
+            <a:r>
+              <a:rPr lang="en-GB" sz="1600" b="0" i="0" dirty="0">
+                <a:solidFill>
+                  <a:srgbClr val="CCCCCC"/>
+                </a:solidFill>
+                <a:effectLst/>
+                <a:latin typeface="Consolas" panose="020B0609020204030204" pitchFamily="49" charset="0"/>
+              </a:rPr>
+              <a:t>) </a:t>
+            </a:r>
+          </a:p>
+          <a:p>
+            <a:pPr marL="342900" indent="-342900">
+              <a:buFont typeface="+mj-lt"/>
+              <a:buAutoNum type="arabicParenR"/>
+            </a:pPr>
+            <a:r>
+              <a:rPr lang="en-GB" sz="1600" b="0" i="0" dirty="0">
+                <a:solidFill>
+                  <a:schemeClr val="accent3"/>
+                </a:solidFill>
+                <a:effectLst/>
+                <a:latin typeface="Consolas" panose="020B0609020204030204" pitchFamily="49" charset="0"/>
+              </a:rPr>
+              <a:t>The sky is green --&gt; False (0.68) </a:t>
+            </a:r>
+          </a:p>
+          <a:p>
+            <a:pPr marL="342900" indent="-342900">
+              <a:buFont typeface="+mj-lt"/>
+              <a:buAutoNum type="arabicParenR"/>
+            </a:pPr>
+            <a:r>
+              <a:rPr lang="en-GB" sz="1600" b="0" i="0" dirty="0">
+                <a:solidFill>
+                  <a:schemeClr val="accent3"/>
+                </a:solidFill>
+                <a:effectLst/>
+                <a:latin typeface="Consolas" panose="020B0609020204030204" pitchFamily="49" charset="0"/>
+              </a:rPr>
+              <a:t>The sky is blue --&gt; True (0.82) </a:t>
+            </a:r>
+          </a:p>
+          <a:p>
+            <a:pPr marL="342900" indent="-342900">
+              <a:buFont typeface="+mj-lt"/>
+              <a:buAutoNum type="arabicParenR"/>
+            </a:pPr>
+            <a:r>
+              <a:rPr lang="en-GB" sz="1600" b="0" i="0" dirty="0">
+                <a:solidFill>
+                  <a:schemeClr val="accent3"/>
+                </a:solidFill>
+                <a:effectLst/>
+                <a:latin typeface="Consolas" panose="020B0609020204030204" pitchFamily="49" charset="0"/>
+              </a:rPr>
+              <a:t>Renault 8 is produced by Fiat --&gt; False (0.81</a:t>
+            </a:r>
+            <a:r>
+              <a:rPr lang="en-GB" b="0" i="0" dirty="0">
+                <a:solidFill>
+                  <a:schemeClr val="accent3"/>
+                </a:solidFill>
+                <a:effectLst/>
+                <a:latin typeface="Consolas" panose="020B0609020204030204" pitchFamily="49" charset="0"/>
+              </a:rPr>
+              <a:t>)</a:t>
+            </a:r>
+            <a:endParaRPr lang="en-GB" dirty="0">
+              <a:solidFill>
+                <a:schemeClr val="accent3"/>
+              </a:solidFill>
+            </a:endParaRPr>
+          </a:p>
+        </p:txBody>
+      </p:sp>
+    </p:spTree>
+    <p:extLst>
+      <p:ext uri="{BB962C8B-B14F-4D97-AF65-F5344CB8AC3E}">
+        <p14:creationId xmlns:p14="http://schemas.microsoft.com/office/powerpoint/2010/main" val="2088318576"/>
+      </p:ext>
+    </p:extLst>
+  </p:cSld>
+  <p:clrMapOvr>
+    <a:masterClrMapping/>
+  </p:clrMapOvr>
+</p:sld>
+</file>
+
+<file path=ppt/slides/slide19.xml><?xml version="1.0" encoding="utf-8"?>
+<p:sld xmlns:a="http://schemas.openxmlformats.org/drawingml/2006/main" xmlns:r="http://schemas.openxmlformats.org/officeDocument/2006/relationships" xmlns:p="http://schemas.openxmlformats.org/presentationml/2006/main">
+  <p:cSld>
+    <p:spTree>
+      <p:nvGrpSpPr>
+        <p:cNvPr id="1" name="">
+          <a:extLst>
+            <a:ext uri="{FF2B5EF4-FFF2-40B4-BE49-F238E27FC236}">
               <a16:creationId xmlns:a16="http://schemas.microsoft.com/office/drawing/2014/main" id="{8A0ECF97-3E86-8493-F084-56EF2044BE38}"/>
             </a:ext>
           </a:extLst>
@@ -33392,7 +34253,7 @@
           <a:p>
             <a:fld id="{33C14F82-BE8C-4CA8-BA76-52B2F053D2D8}" type="slidenum">
               <a:rPr lang="en-GB" smtClean="0"/>
-              <a:t>16</a:t>
+              <a:t>19</a:t>
             </a:fld>
             <a:endParaRPr lang="en-GB"/>
           </a:p>

</xml_diff>